<commit_message>
Mise à jour 2024
</commit_message>
<xml_diff>
--- a/0_ressources/introduction.pptx
+++ b/0_ressources/introduction.pptx
@@ -206,7 +206,7 @@
           <a:p>
             <a:fld id="{2A11EF29-F031-4460-BDC1-2F4C0816FF62}" type="datetimeFigureOut">
               <a:rPr lang="fr-FR" smtClean="0"/>
-              <a:t>28/01/2023</a:t>
+              <a:t>14/01/2024</a:t>
             </a:fld>
             <a:endParaRPr lang="fr-FR"/>
           </a:p>
@@ -925,7 +925,7 @@
           <a:p>
             <a:fld id="{61E68B4C-A18C-4580-9DBF-10C1B552DA0A}" type="datetime1">
               <a:rPr lang="fr-FR" smtClean="0"/>
-              <a:t>28/01/2023</a:t>
+              <a:t>14/01/2024</a:t>
             </a:fld>
             <a:endParaRPr lang="fr-FR"/>
           </a:p>
@@ -1096,7 +1096,7 @@
           <a:p>
             <a:fld id="{33BBDF30-760E-44D6-9977-54B88BDB306F}" type="datetime1">
               <a:rPr lang="fr-FR" smtClean="0"/>
-              <a:t>28/01/2023</a:t>
+              <a:t>14/01/2024</a:t>
             </a:fld>
             <a:endParaRPr lang="fr-FR"/>
           </a:p>
@@ -1277,7 +1277,7 @@
           <a:p>
             <a:fld id="{936C1701-50D5-46A3-8884-D7962FCBEB35}" type="datetime1">
               <a:rPr lang="fr-FR" smtClean="0"/>
-              <a:t>28/01/2023</a:t>
+              <a:t>14/01/2024</a:t>
             </a:fld>
             <a:endParaRPr lang="fr-FR"/>
           </a:p>
@@ -1448,7 +1448,7 @@
           <a:p>
             <a:fld id="{FB1C5CD7-A317-4B47-8334-BE6C77F3043D}" type="datetime1">
               <a:rPr lang="fr-FR" smtClean="0"/>
-              <a:t>28/01/2023</a:t>
+              <a:t>14/01/2024</a:t>
             </a:fld>
             <a:endParaRPr lang="fr-FR"/>
           </a:p>
@@ -1696,7 +1696,7 @@
           <a:p>
             <a:fld id="{27BB4E62-2182-4E64-A865-E0316FE55639}" type="datetime1">
               <a:rPr lang="fr-FR" smtClean="0"/>
-              <a:t>28/01/2023</a:t>
+              <a:t>14/01/2024</a:t>
             </a:fld>
             <a:endParaRPr lang="fr-FR"/>
           </a:p>
@@ -1928,7 +1928,7 @@
           <a:p>
             <a:fld id="{5C848654-37BD-4CD6-BC6D-5ABAE3294E16}" type="datetime1">
               <a:rPr lang="fr-FR" smtClean="0"/>
-              <a:t>28/01/2023</a:t>
+              <a:t>14/01/2024</a:t>
             </a:fld>
             <a:endParaRPr lang="fr-FR"/>
           </a:p>
@@ -2295,7 +2295,7 @@
           <a:p>
             <a:fld id="{868D0E6B-48A9-4A38-BF7D-049DC383303E}" type="datetime1">
               <a:rPr lang="fr-FR" smtClean="0"/>
-              <a:t>28/01/2023</a:t>
+              <a:t>14/01/2024</a:t>
             </a:fld>
             <a:endParaRPr lang="fr-FR"/>
           </a:p>
@@ -2415,7 +2415,7 @@
           <a:p>
             <a:fld id="{48C90E04-18E3-4E93-8B1D-B61C20F8CDF0}" type="datetime1">
               <a:rPr lang="fr-FR" smtClean="0"/>
-              <a:t>28/01/2023</a:t>
+              <a:t>14/01/2024</a:t>
             </a:fld>
             <a:endParaRPr lang="fr-FR"/>
           </a:p>
@@ -2513,7 +2513,7 @@
           <a:p>
             <a:fld id="{35B94D30-C13E-4A60-87D1-612090FE3305}" type="datetime1">
               <a:rPr lang="fr-FR" smtClean="0"/>
-              <a:t>28/01/2023</a:t>
+              <a:t>14/01/2024</a:t>
             </a:fld>
             <a:endParaRPr lang="fr-FR"/>
           </a:p>
@@ -2791,7 +2791,7 @@
           <a:p>
             <a:fld id="{566614E8-8C48-447B-8312-B5AD964AE5CA}" type="datetime1">
               <a:rPr lang="fr-FR" smtClean="0"/>
-              <a:t>28/01/2023</a:t>
+              <a:t>14/01/2024</a:t>
             </a:fld>
             <a:endParaRPr lang="fr-FR"/>
           </a:p>
@@ -3046,7 +3046,7 @@
           <a:p>
             <a:fld id="{269CDBDD-4A65-4264-B0FD-6A38E12ADD25}" type="datetime1">
               <a:rPr lang="fr-FR" smtClean="0"/>
-              <a:t>28/01/2023</a:t>
+              <a:t>14/01/2024</a:t>
             </a:fld>
             <a:endParaRPr lang="fr-FR"/>
           </a:p>
@@ -3260,7 +3260,7 @@
           <a:p>
             <a:fld id="{A2F7CCBE-29F8-4CD9-B9A9-0931E30CBD53}" type="datetime1">
               <a:rPr lang="fr-FR" smtClean="0"/>
-              <a:t>28/01/2023</a:t>
+              <a:t>14/01/2024</a:t>
             </a:fld>
             <a:endParaRPr lang="fr-FR"/>
           </a:p>
@@ -4034,7 +4034,7 @@
             <a:pPr lvl="1"/>
             <a:r>
               <a:rPr lang="fr-FR" dirty="0"/>
-              <a:t>Version 13 en 2022</a:t>
+              <a:t>Version 14 en 2024</a:t>
             </a:r>
           </a:p>
           <a:p>
@@ -4054,7 +4054,7 @@
             <a:pPr lvl="1"/>
             <a:r>
               <a:rPr lang="fr-FR" dirty="0"/>
-              <a:t>Version 16 en 2023</a:t>
+              <a:t>Version 17 en 2023</a:t>
             </a:r>
           </a:p>
           <a:p>

</xml_diff>